<commit_message>
some changes to the paper, added results, restructured it, added discussion and conclusion
</commit_message>
<xml_diff>
--- a/final-paper/presentation.pptx
+++ b/final-paper/presentation.pptx
@@ -267,7 +267,7 @@
           <a:p>
             <a:fld id="{C70F2AAC-11D6-4BDF-B217-4752CAD904E1}" type="datetimeFigureOut">
               <a:rPr lang="nl-NL" smtClean="0"/>
-              <a:t>13-4-2020</a:t>
+              <a:t>14-4-2020</a:t>
             </a:fld>
             <a:endParaRPr lang="nl-NL" dirty="0"/>
           </a:p>
@@ -321,7 +321,7 @@
           <a:p>
             <a:fld id="{EAE56F0F-D680-4283-B20F-03857F50DE1D}" type="slidenum">
               <a:rPr lang="nl-NL" smtClean="0"/>
-              <a:t>‹nr.›</a:t>
+              <a:t>‹#›</a:t>
             </a:fld>
             <a:endParaRPr lang="nl-NL" dirty="0"/>
           </a:p>
@@ -465,7 +465,7 @@
           <a:p>
             <a:fld id="{C70F2AAC-11D6-4BDF-B217-4752CAD904E1}" type="datetimeFigureOut">
               <a:rPr lang="nl-NL" smtClean="0"/>
-              <a:t>13-4-2020</a:t>
+              <a:t>14-4-2020</a:t>
             </a:fld>
             <a:endParaRPr lang="nl-NL" dirty="0"/>
           </a:p>
@@ -519,7 +519,7 @@
           <a:p>
             <a:fld id="{EAE56F0F-D680-4283-B20F-03857F50DE1D}" type="slidenum">
               <a:rPr lang="nl-NL" smtClean="0"/>
-              <a:t>‹nr.›</a:t>
+              <a:t>‹#›</a:t>
             </a:fld>
             <a:endParaRPr lang="nl-NL" dirty="0"/>
           </a:p>
@@ -673,7 +673,7 @@
           <a:p>
             <a:fld id="{C70F2AAC-11D6-4BDF-B217-4752CAD904E1}" type="datetimeFigureOut">
               <a:rPr lang="nl-NL" smtClean="0"/>
-              <a:t>13-4-2020</a:t>
+              <a:t>14-4-2020</a:t>
             </a:fld>
             <a:endParaRPr lang="nl-NL" dirty="0"/>
           </a:p>
@@ -727,7 +727,7 @@
           <a:p>
             <a:fld id="{EAE56F0F-D680-4283-B20F-03857F50DE1D}" type="slidenum">
               <a:rPr lang="nl-NL" smtClean="0"/>
-              <a:t>‹nr.›</a:t>
+              <a:t>‹#›</a:t>
             </a:fld>
             <a:endParaRPr lang="nl-NL" dirty="0"/>
           </a:p>
@@ -871,7 +871,7 @@
           <a:p>
             <a:fld id="{C70F2AAC-11D6-4BDF-B217-4752CAD904E1}" type="datetimeFigureOut">
               <a:rPr lang="nl-NL" smtClean="0"/>
-              <a:t>13-4-2020</a:t>
+              <a:t>14-4-2020</a:t>
             </a:fld>
             <a:endParaRPr lang="nl-NL" dirty="0"/>
           </a:p>
@@ -925,7 +925,7 @@
           <a:p>
             <a:fld id="{EAE56F0F-D680-4283-B20F-03857F50DE1D}" type="slidenum">
               <a:rPr lang="nl-NL" smtClean="0"/>
-              <a:t>‹nr.›</a:t>
+              <a:t>‹#›</a:t>
             </a:fld>
             <a:endParaRPr lang="nl-NL" dirty="0"/>
           </a:p>
@@ -1146,7 +1146,7 @@
           <a:p>
             <a:fld id="{C70F2AAC-11D6-4BDF-B217-4752CAD904E1}" type="datetimeFigureOut">
               <a:rPr lang="nl-NL" smtClean="0"/>
-              <a:t>13-4-2020</a:t>
+              <a:t>14-4-2020</a:t>
             </a:fld>
             <a:endParaRPr lang="nl-NL" dirty="0"/>
           </a:p>
@@ -1200,7 +1200,7 @@
           <a:p>
             <a:fld id="{EAE56F0F-D680-4283-B20F-03857F50DE1D}" type="slidenum">
               <a:rPr lang="nl-NL" smtClean="0"/>
-              <a:t>‹nr.›</a:t>
+              <a:t>‹#›</a:t>
             </a:fld>
             <a:endParaRPr lang="nl-NL" dirty="0"/>
           </a:p>
@@ -1411,7 +1411,7 @@
           <a:p>
             <a:fld id="{C70F2AAC-11D6-4BDF-B217-4752CAD904E1}" type="datetimeFigureOut">
               <a:rPr lang="nl-NL" smtClean="0"/>
-              <a:t>13-4-2020</a:t>
+              <a:t>14-4-2020</a:t>
             </a:fld>
             <a:endParaRPr lang="nl-NL" dirty="0"/>
           </a:p>
@@ -1465,7 +1465,7 @@
           <a:p>
             <a:fld id="{EAE56F0F-D680-4283-B20F-03857F50DE1D}" type="slidenum">
               <a:rPr lang="nl-NL" smtClean="0"/>
-              <a:t>‹nr.›</a:t>
+              <a:t>‹#›</a:t>
             </a:fld>
             <a:endParaRPr lang="nl-NL" dirty="0"/>
           </a:p>
@@ -1823,7 +1823,7 @@
           <a:p>
             <a:fld id="{C70F2AAC-11D6-4BDF-B217-4752CAD904E1}" type="datetimeFigureOut">
               <a:rPr lang="nl-NL" smtClean="0"/>
-              <a:t>13-4-2020</a:t>
+              <a:t>14-4-2020</a:t>
             </a:fld>
             <a:endParaRPr lang="nl-NL" dirty="0"/>
           </a:p>
@@ -1877,7 +1877,7 @@
           <a:p>
             <a:fld id="{EAE56F0F-D680-4283-B20F-03857F50DE1D}" type="slidenum">
               <a:rPr lang="nl-NL" smtClean="0"/>
-              <a:t>‹nr.›</a:t>
+              <a:t>‹#›</a:t>
             </a:fld>
             <a:endParaRPr lang="nl-NL" dirty="0"/>
           </a:p>
@@ -1964,7 +1964,7 @@
           <a:p>
             <a:fld id="{C70F2AAC-11D6-4BDF-B217-4752CAD904E1}" type="datetimeFigureOut">
               <a:rPr lang="nl-NL" smtClean="0"/>
-              <a:t>13-4-2020</a:t>
+              <a:t>14-4-2020</a:t>
             </a:fld>
             <a:endParaRPr lang="nl-NL" dirty="0"/>
           </a:p>
@@ -2018,7 +2018,7 @@
           <a:p>
             <a:fld id="{EAE56F0F-D680-4283-B20F-03857F50DE1D}" type="slidenum">
               <a:rPr lang="nl-NL" smtClean="0"/>
-              <a:t>‹nr.›</a:t>
+              <a:t>‹#›</a:t>
             </a:fld>
             <a:endParaRPr lang="nl-NL" dirty="0"/>
           </a:p>
@@ -2077,7 +2077,7 @@
           <a:p>
             <a:fld id="{C70F2AAC-11D6-4BDF-B217-4752CAD904E1}" type="datetimeFigureOut">
               <a:rPr lang="nl-NL" smtClean="0"/>
-              <a:t>13-4-2020</a:t>
+              <a:t>14-4-2020</a:t>
             </a:fld>
             <a:endParaRPr lang="nl-NL" dirty="0"/>
           </a:p>
@@ -2131,7 +2131,7 @@
           <a:p>
             <a:fld id="{EAE56F0F-D680-4283-B20F-03857F50DE1D}" type="slidenum">
               <a:rPr lang="nl-NL" smtClean="0"/>
-              <a:t>‹nr.›</a:t>
+              <a:t>‹#›</a:t>
             </a:fld>
             <a:endParaRPr lang="nl-NL" dirty="0"/>
           </a:p>
@@ -2388,7 +2388,7 @@
           <a:p>
             <a:fld id="{C70F2AAC-11D6-4BDF-B217-4752CAD904E1}" type="datetimeFigureOut">
               <a:rPr lang="nl-NL" smtClean="0"/>
-              <a:t>13-4-2020</a:t>
+              <a:t>14-4-2020</a:t>
             </a:fld>
             <a:endParaRPr lang="nl-NL" dirty="0"/>
           </a:p>
@@ -2442,7 +2442,7 @@
           <a:p>
             <a:fld id="{EAE56F0F-D680-4283-B20F-03857F50DE1D}" type="slidenum">
               <a:rPr lang="nl-NL" smtClean="0"/>
-              <a:t>‹nr.›</a:t>
+              <a:t>‹#›</a:t>
             </a:fld>
             <a:endParaRPr lang="nl-NL" dirty="0"/>
           </a:p>
@@ -2676,7 +2676,7 @@
           <a:p>
             <a:fld id="{C70F2AAC-11D6-4BDF-B217-4752CAD904E1}" type="datetimeFigureOut">
               <a:rPr lang="nl-NL" smtClean="0"/>
-              <a:t>13-4-2020</a:t>
+              <a:t>14-4-2020</a:t>
             </a:fld>
             <a:endParaRPr lang="nl-NL" dirty="0"/>
           </a:p>
@@ -2730,7 +2730,7 @@
           <a:p>
             <a:fld id="{EAE56F0F-D680-4283-B20F-03857F50DE1D}" type="slidenum">
               <a:rPr lang="nl-NL" smtClean="0"/>
-              <a:t>‹nr.›</a:t>
+              <a:t>‹#›</a:t>
             </a:fld>
             <a:endParaRPr lang="nl-NL" dirty="0"/>
           </a:p>
@@ -2917,7 +2917,7 @@
           <a:p>
             <a:fld id="{C70F2AAC-11D6-4BDF-B217-4752CAD904E1}" type="datetimeFigureOut">
               <a:rPr lang="nl-NL" smtClean="0"/>
-              <a:t>13-4-2020</a:t>
+              <a:t>14-4-2020</a:t>
             </a:fld>
             <a:endParaRPr lang="nl-NL" dirty="0"/>
           </a:p>
@@ -3007,7 +3007,7 @@
           <a:p>
             <a:fld id="{EAE56F0F-D680-4283-B20F-03857F50DE1D}" type="slidenum">
               <a:rPr lang="nl-NL" smtClean="0"/>
-              <a:t>‹nr.›</a:t>
+              <a:t>‹#›</a:t>
             </a:fld>
             <a:endParaRPr lang="nl-NL" dirty="0"/>
           </a:p>

</xml_diff>